<commit_message>
Added Dev Ops slide
</commit_message>
<xml_diff>
--- a/React Vs Shared State Deck.pptx
+++ b/React Vs Shared State Deck.pptx
@@ -15,9 +15,10 @@
     <p:sldId id="263" r:id="rId9"/>
     <p:sldId id="264" r:id="rId10"/>
     <p:sldId id="265" r:id="rId11"/>
-    <p:sldId id="266" r:id="rId12"/>
-    <p:sldId id="268" r:id="rId13"/>
-    <p:sldId id="267" r:id="rId14"/>
+    <p:sldId id="269" r:id="rId12"/>
+    <p:sldId id="266" r:id="rId13"/>
+    <p:sldId id="268" r:id="rId14"/>
+    <p:sldId id="267" r:id="rId15"/>
   </p:sldIdLst>
   <p:sldSz cx="9144000" cy="6858000" type="screen4x3"/>
   <p:notesSz cx="6858000" cy="9144000"/>
@@ -116,6 +117,34 @@
       </a:defRPr>
     </a:lvl9pPr>
   </p:defaultTextStyle>
+  <p:extLst>
+    <p:ext uri="{521415D9-36F7-43E2-AB2F-B90AF26B5E84}">
+      <p14:sectionLst xmlns:p14="http://schemas.microsoft.com/office/powerpoint/2010/main">
+        <p14:section name="Default Section" id="{E59A0559-7AE1-AA46-9D61-7CDE4117ED85}">
+          <p14:sldIdLst>
+            <p14:sldId id="256"/>
+            <p14:sldId id="257"/>
+            <p14:sldId id="258"/>
+            <p14:sldId id="259"/>
+            <p14:sldId id="260"/>
+            <p14:sldId id="261"/>
+            <p14:sldId id="262"/>
+            <p14:sldId id="263"/>
+            <p14:sldId id="264"/>
+            <p14:sldId id="265"/>
+          </p14:sldIdLst>
+        </p14:section>
+        <p14:section name="Untitled Section" id="{CC53A510-CAFF-7348-A3D5-B3357FAEC6BD}">
+          <p14:sldIdLst>
+            <p14:sldId id="269"/>
+            <p14:sldId id="266"/>
+            <p14:sldId id="268"/>
+            <p14:sldId id="267"/>
+          </p14:sldIdLst>
+        </p14:section>
+      </p14:sectionLst>
+    </p:ext>
+  </p:extLst>
 </p:presentation>
 </file>
 
@@ -3385,7 +3414,15 @@
           <a:p>
             <a:r>
               <a:rPr lang="en-US" dirty="0" smtClean="0"/>
-              <a:t>Okay enough slides</a:t>
+              <a:t>A Quick </a:t>
+            </a:r>
+            <a:r>
+              <a:rPr lang="en-US" dirty="0" err="1" smtClean="0"/>
+              <a:t>Dev</a:t>
+            </a:r>
+            <a:r>
+              <a:rPr lang="en-US" dirty="0" smtClean="0"/>
+              <a:t> Ops Slide</a:t>
             </a:r>
             <a:endParaRPr lang="en-US" dirty="0"/>
           </a:p>
@@ -3401,29 +3438,249 @@
             <p:ph idx="1"/>
           </p:nvPr>
         </p:nvSpPr>
-        <p:spPr/>
-        <p:txBody>
-          <a:bodyPr/>
-          <a:lstStyle/>
-          <a:p>
-            <a:r>
-              <a:rPr lang="en-US" dirty="0" smtClean="0"/>
-              <a:t>Let’s look at and run some code!</a:t>
+        <p:spPr>
+          <a:xfrm>
+            <a:off x="457200" y="1600200"/>
+            <a:ext cx="4114800" cy="4525963"/>
+          </a:xfrm>
+        </p:spPr>
+        <p:txBody>
+          <a:bodyPr>
+            <a:normAutofit fontScale="62500" lnSpcReduction="20000"/>
+          </a:bodyPr>
+          <a:lstStyle/>
+          <a:p>
+            <a:r>
+              <a:rPr lang="en-US" dirty="0" smtClean="0"/>
+              <a:t>HBC is very focused on </a:t>
+            </a:r>
+            <a:r>
+              <a:rPr lang="en-US" dirty="0" err="1" smtClean="0"/>
+              <a:t>Dev</a:t>
+            </a:r>
+            <a:r>
+              <a:rPr lang="en-US" dirty="0" smtClean="0"/>
+              <a:t> Ops</a:t>
+            </a:r>
+          </a:p>
+          <a:p>
+            <a:r>
+              <a:rPr lang="en-US" dirty="0" smtClean="0"/>
+              <a:t>Developers are empowered to work with Infrastructure to create </a:t>
+            </a:r>
+            <a:r>
+              <a:rPr lang="en-US" dirty="0" err="1" smtClean="0"/>
+              <a:t>dev</a:t>
+            </a:r>
+            <a:r>
+              <a:rPr lang="en-US" dirty="0" smtClean="0"/>
+              <a:t> environments that can move all the way to Production</a:t>
+            </a:r>
+          </a:p>
+          <a:p>
+            <a:r>
+              <a:rPr lang="en-US" dirty="0" smtClean="0"/>
+              <a:t>We are using </a:t>
+            </a:r>
+          </a:p>
+          <a:p>
+            <a:pPr lvl="1"/>
+            <a:r>
+              <a:rPr lang="en-US" dirty="0" smtClean="0"/>
+              <a:t>Kitchen (testing)</a:t>
+            </a:r>
+          </a:p>
+          <a:p>
+            <a:pPr lvl="1"/>
+            <a:r>
+              <a:rPr lang="en-US" dirty="0" smtClean="0"/>
+              <a:t>Vagrant (virtual machines)</a:t>
+            </a:r>
+          </a:p>
+          <a:p>
+            <a:pPr lvl="1"/>
+            <a:r>
+              <a:rPr lang="en-US" dirty="0" smtClean="0"/>
+              <a:t>Puppet (provisioning)</a:t>
+            </a:r>
+          </a:p>
+          <a:p>
+            <a:pPr lvl="1"/>
+            <a:r>
+              <a:rPr lang="en-US" dirty="0" smtClean="0"/>
+              <a:t>Librarian Puppet (more provisioning)</a:t>
+            </a:r>
+          </a:p>
+          <a:p>
+            <a:pPr lvl="1"/>
+            <a:r>
+              <a:rPr lang="en-US" dirty="0" err="1" smtClean="0"/>
+              <a:t>Docker</a:t>
+            </a:r>
+            <a:r>
+              <a:rPr lang="en-US" dirty="0" smtClean="0"/>
+              <a:t> (containers)</a:t>
+            </a:r>
+          </a:p>
+          <a:p>
+            <a:r>
+              <a:rPr lang="en-US" dirty="0" smtClean="0"/>
+              <a:t>This allows us to treat infrastructure as code- versioning, pull requests, code review, regression testing, reproducibility</a:t>
             </a:r>
             <a:endParaRPr lang="en-US" dirty="0"/>
+          </a:p>
+        </p:txBody>
+      </p:sp>
+      <p:sp>
+        <p:nvSpPr>
+          <p:cNvPr id="4" name="TextBox 3"/>
+          <p:cNvSpPr txBox="1"/>
+          <p:nvPr/>
+        </p:nvSpPr>
+        <p:spPr>
+          <a:xfrm>
+            <a:off x="4967110" y="1600200"/>
+            <a:ext cx="3826970" cy="5324535"/>
+          </a:xfrm>
+          <a:prstGeom prst="rect">
+            <a:avLst/>
+          </a:prstGeom>
+          <a:noFill/>
+        </p:spPr>
+        <p:txBody>
+          <a:bodyPr wrap="square" rtlCol="0">
+            <a:spAutoFit/>
+          </a:bodyPr>
+          <a:lstStyle/>
+          <a:p>
+            <a:pPr marL="285750" indent="-285750">
+              <a:buFont typeface="Arial"/>
+              <a:buChar char="•"/>
+            </a:pPr>
+            <a:r>
+              <a:rPr lang="en-US" sz="2000" dirty="0" smtClean="0"/>
+              <a:t>For this project I started with a </a:t>
+            </a:r>
+            <a:r>
+              <a:rPr lang="en-US" sz="2000" dirty="0"/>
+              <a:t>L</a:t>
+            </a:r>
+            <a:r>
+              <a:rPr lang="en-US" sz="2000" dirty="0" smtClean="0"/>
+              <a:t>inux base box</a:t>
+            </a:r>
+          </a:p>
+          <a:p>
+            <a:pPr marL="285750" indent="-285750">
+              <a:buFont typeface="Arial"/>
+              <a:buChar char="•"/>
+            </a:pPr>
+            <a:r>
+              <a:rPr lang="en-US" sz="2000" dirty="0" smtClean="0"/>
+              <a:t>I used Puppet Librarian to source modules for SBT, Java, </a:t>
+            </a:r>
+            <a:r>
+              <a:rPr lang="en-US" sz="2000" dirty="0" err="1" smtClean="0"/>
+              <a:t>MongoSB</a:t>
+            </a:r>
+            <a:r>
+              <a:rPr lang="en-US" sz="2000" dirty="0" smtClean="0"/>
+              <a:t>, and </a:t>
+            </a:r>
+            <a:r>
+              <a:rPr lang="en-US" sz="2000" dirty="0" err="1" smtClean="0"/>
+              <a:t>Docker</a:t>
+            </a:r>
+            <a:endParaRPr lang="en-US" sz="2000" dirty="0" smtClean="0"/>
+          </a:p>
+          <a:p>
+            <a:pPr marL="285750" indent="-285750">
+              <a:buFont typeface="Arial"/>
+              <a:buChar char="•"/>
+            </a:pPr>
+            <a:r>
+              <a:rPr lang="en-US" sz="2000" dirty="0" smtClean="0"/>
+              <a:t>Then I used Puppet to install those modules in my base box (provision).</a:t>
+            </a:r>
+          </a:p>
+          <a:p>
+            <a:pPr marL="285750" indent="-285750">
+              <a:buFont typeface="Arial"/>
+              <a:buChar char="•"/>
+            </a:pPr>
+            <a:r>
+              <a:rPr lang="en-US" sz="2000" dirty="0" smtClean="0"/>
+              <a:t>Finally, I used Puppet to spin up and deploy a </a:t>
+            </a:r>
+            <a:r>
+              <a:rPr lang="en-US" sz="2000" dirty="0" err="1" smtClean="0"/>
+              <a:t>Docker</a:t>
+            </a:r>
+            <a:r>
+              <a:rPr lang="en-US" sz="2000" dirty="0" smtClean="0"/>
+              <a:t> container running </a:t>
+            </a:r>
+            <a:r>
+              <a:rPr lang="en-US" sz="2000" dirty="0" err="1" smtClean="0"/>
+              <a:t>StatsD</a:t>
+            </a:r>
+            <a:r>
+              <a:rPr lang="en-US" sz="2000" dirty="0" smtClean="0"/>
+              <a:t> and Graphite.</a:t>
+            </a:r>
+          </a:p>
+          <a:p>
+            <a:pPr marL="285750" indent="-285750">
+              <a:buFont typeface="Arial"/>
+              <a:buChar char="•"/>
+            </a:pPr>
+            <a:r>
+              <a:rPr lang="en-US" sz="2000" dirty="0" smtClean="0"/>
+              <a:t>At the end of all this I could run my Play applications with SBT and Java and I had running </a:t>
+            </a:r>
+            <a:r>
+              <a:rPr lang="en-US" sz="2000" dirty="0" err="1" smtClean="0"/>
+              <a:t>MongoDB</a:t>
+            </a:r>
+            <a:r>
+              <a:rPr lang="en-US" sz="2000" dirty="0" smtClean="0"/>
+              <a:t>, </a:t>
+            </a:r>
+            <a:r>
+              <a:rPr lang="en-US" sz="2000" dirty="0" err="1" smtClean="0"/>
+              <a:t>StatsD</a:t>
+            </a:r>
+            <a:r>
+              <a:rPr lang="en-US" sz="2000" dirty="0" smtClean="0"/>
+              <a:t>, and Graphite instances ready to use.</a:t>
+            </a:r>
+          </a:p>
+          <a:p>
+            <a:pPr marL="285750" indent="-285750">
+              <a:buFont typeface="Arial"/>
+              <a:buChar char="•"/>
+            </a:pPr>
+            <a:endParaRPr lang="en-US" sz="2000" dirty="0"/>
           </a:p>
         </p:txBody>
       </p:sp>
     </p:spTree>
     <p:extLst>
       <p:ext uri="{BB962C8B-B14F-4D97-AF65-F5344CB8AC3E}">
-        <p14:creationId xmlns:p14="http://schemas.microsoft.com/office/powerpoint/2010/main" val="3691453240"/>
+        <p14:creationId xmlns:p14="http://schemas.microsoft.com/office/powerpoint/2010/main" val="2096971870"/>
       </p:ext>
     </p:extLst>
   </p:cSld>
   <p:clrMapOvr>
     <a:masterClrMapping/>
   </p:clrMapOvr>
+  <p:timing>
+    <p:tnLst>
+      <p:par>
+        <p:cTn xmlns:p14="http://schemas.microsoft.com/office/powerpoint/2010/main" id="1" dur="indefinite" restart="never" nodeType="tmRoot"/>
+      </p:par>
+    </p:tnLst>
+  </p:timing>
 </p:sld>
 </file>
 
@@ -3461,6 +3718,82 @@
           <a:p>
             <a:r>
               <a:rPr lang="en-US" dirty="0" smtClean="0"/>
+              <a:t>Okay enough slides</a:t>
+            </a:r>
+            <a:endParaRPr lang="en-US" dirty="0"/>
+          </a:p>
+        </p:txBody>
+      </p:sp>
+      <p:sp>
+        <p:nvSpPr>
+          <p:cNvPr id="3" name="Content Placeholder 2"/>
+          <p:cNvSpPr>
+            <a:spLocks noGrp="1"/>
+          </p:cNvSpPr>
+          <p:nvPr>
+            <p:ph idx="1"/>
+          </p:nvPr>
+        </p:nvSpPr>
+        <p:spPr/>
+        <p:txBody>
+          <a:bodyPr/>
+          <a:lstStyle/>
+          <a:p>
+            <a:r>
+              <a:rPr lang="en-US" dirty="0" smtClean="0"/>
+              <a:t>Let’s look at and run some code!</a:t>
+            </a:r>
+            <a:endParaRPr lang="en-US" dirty="0"/>
+          </a:p>
+        </p:txBody>
+      </p:sp>
+    </p:spTree>
+    <p:extLst>
+      <p:ext uri="{BB962C8B-B14F-4D97-AF65-F5344CB8AC3E}">
+        <p14:creationId xmlns:p14="http://schemas.microsoft.com/office/powerpoint/2010/main" val="3691453240"/>
+      </p:ext>
+    </p:extLst>
+  </p:cSld>
+  <p:clrMapOvr>
+    <a:masterClrMapping/>
+  </p:clrMapOvr>
+</p:sld>
+</file>
+
+<file path=ppt/slides/slide13.xml><?xml version="1.0" encoding="utf-8"?>
+<p:sld xmlns:a="http://schemas.openxmlformats.org/drawingml/2006/main" xmlns:r="http://schemas.openxmlformats.org/officeDocument/2006/relationships" xmlns:p="http://schemas.openxmlformats.org/presentationml/2006/main">
+  <p:cSld>
+    <p:spTree>
+      <p:nvGrpSpPr>
+        <p:cNvPr id="1" name=""/>
+        <p:cNvGrpSpPr/>
+        <p:nvPr/>
+      </p:nvGrpSpPr>
+      <p:grpSpPr>
+        <a:xfrm>
+          <a:off x="0" y="0"/>
+          <a:ext cx="0" cy="0"/>
+          <a:chOff x="0" y="0"/>
+          <a:chExt cx="0" cy="0"/>
+        </a:xfrm>
+      </p:grpSpPr>
+      <p:sp>
+        <p:nvSpPr>
+          <p:cNvPr id="2" name="Title 1"/>
+          <p:cNvSpPr>
+            <a:spLocks noGrp="1"/>
+          </p:cNvSpPr>
+          <p:nvPr>
+            <p:ph type="title"/>
+          </p:nvPr>
+        </p:nvSpPr>
+        <p:spPr/>
+        <p:txBody>
+          <a:bodyPr/>
+          <a:lstStyle/>
+          <a:p>
+            <a:r>
+              <a:rPr lang="en-US" dirty="0" smtClean="0"/>
               <a:t>Questions</a:t>
             </a:r>
             <a:endParaRPr lang="en-US" dirty="0"/>
@@ -3503,7 +3836,7 @@
 </p:sld>
 </file>
 
-<file path=ppt/slides/slide13.xml><?xml version="1.0" encoding="utf-8"?>
+<file path=ppt/slides/slide14.xml><?xml version="1.0" encoding="utf-8"?>
 <p:sld xmlns:a="http://schemas.openxmlformats.org/drawingml/2006/main" xmlns:r="http://schemas.openxmlformats.org/officeDocument/2006/relationships" xmlns:p="http://schemas.openxmlformats.org/presentationml/2006/main">
   <p:cSld>
     <p:spTree>

</xml_diff>